<commit_message>
some more univariate analysis
</commit_message>
<xml_diff>
--- a/Lending Club Case Study_SelvakumarKaruppannan.pptx
+++ b/Lending Club Case Study_SelvakumarKaruppannan.pptx
@@ -10438,6 +10438,1667 @@
           </a:p>
         </p:txBody>
       </p:sp>
+      <p:graphicFrame>
+        <p:nvGraphicFramePr>
+          <p:cNvPr id="3" name="Table 2">
+            <a:extLst>
+              <a:ext uri="{FF2B5EF4-FFF2-40B4-BE49-F238E27FC236}">
+                <a16:creationId xmlns:a16="http://schemas.microsoft.com/office/drawing/2014/main" id="{7E62EDDC-28D0-4317-ABA1-0C02E1CBB6EB}"/>
+              </a:ext>
+            </a:extLst>
+          </p:cNvPr>
+          <p:cNvGraphicFramePr>
+            <a:graphicFrameLocks noGrp="1"/>
+          </p:cNvGraphicFramePr>
+          <p:nvPr>
+            <p:extLst>
+              <p:ext uri="{D42A27DB-BD31-4B8C-83A1-F6EECF244321}">
+                <p14:modId xmlns:p14="http://schemas.microsoft.com/office/powerpoint/2010/main" val="3332609647"/>
+              </p:ext>
+            </p:extLst>
+          </p:nvPr>
+        </p:nvGraphicFramePr>
+        <p:xfrm>
+          <a:off x="8012529" y="2087664"/>
+          <a:ext cx="2933700" cy="2578100"/>
+        </p:xfrm>
+        <a:graphic>
+          <a:graphicData uri="http://schemas.openxmlformats.org/drawingml/2006/table">
+            <a:tbl>
+              <a:tblPr/>
+              <a:tblGrid>
+                <a:gridCol w="1028700">
+                  <a:extLst>
+                    <a:ext uri="{9D8B030D-6E8A-4147-A177-3AD203B41FA5}">
+                      <a16:colId xmlns:a16="http://schemas.microsoft.com/office/drawing/2014/main" val="1730934463"/>
+                    </a:ext>
+                  </a:extLst>
+                </a:gridCol>
+                <a:gridCol w="1295400">
+                  <a:extLst>
+                    <a:ext uri="{9D8B030D-6E8A-4147-A177-3AD203B41FA5}">
+                      <a16:colId xmlns:a16="http://schemas.microsoft.com/office/drawing/2014/main" val="1823420366"/>
+                    </a:ext>
+                  </a:extLst>
+                </a:gridCol>
+                <a:gridCol w="609600">
+                  <a:extLst>
+                    <a:ext uri="{9D8B030D-6E8A-4147-A177-3AD203B41FA5}">
+                      <a16:colId xmlns:a16="http://schemas.microsoft.com/office/drawing/2014/main" val="3973756713"/>
+                    </a:ext>
+                  </a:extLst>
+                </a:gridCol>
+              </a:tblGrid>
+              <a:tr h="184150">
+                <a:tc>
+                  <a:txBody>
+                    <a:bodyPr/>
+                    <a:lstStyle/>
+                    <a:p>
+                      <a:pPr algn="l" fontAlgn="b"/>
+                      <a:r>
+                        <a:rPr lang="en-US" sz="1100" b="1" i="0" u="none" strike="noStrike">
+                          <a:solidFill>
+                            <a:srgbClr val="000000"/>
+                          </a:solidFill>
+                          <a:effectLst/>
+                          <a:latin typeface="Calibri" panose="020F0502020204030204" pitchFamily="34" charset="0"/>
+                        </a:rPr>
+                        <a:t>Row Labels</a:t>
+                      </a:r>
+                    </a:p>
+                  </a:txBody>
+                  <a:tcPr marL="6350" marR="6350" marT="6350" marB="0" anchor="b">
+                    <a:lnL>
+                      <a:noFill/>
+                    </a:lnL>
+                    <a:lnR>
+                      <a:noFill/>
+                    </a:lnR>
+                    <a:lnT>
+                      <a:noFill/>
+                    </a:lnT>
+                    <a:lnB w="6350" cap="flat" cmpd="sng" algn="ctr">
+                      <a:solidFill>
+                        <a:srgbClr val="8EA9DB"/>
+                      </a:solidFill>
+                      <a:prstDash val="solid"/>
+                      <a:round/>
+                      <a:headEnd type="none" w="med" len="med"/>
+                      <a:tailEnd type="none" w="med" len="med"/>
+                    </a:lnB>
+                    <a:solidFill>
+                      <a:srgbClr val="D9E1F2"/>
+                    </a:solidFill>
+                  </a:tcPr>
+                </a:tc>
+                <a:tc>
+                  <a:txBody>
+                    <a:bodyPr/>
+                    <a:lstStyle/>
+                    <a:p>
+                      <a:pPr algn="l" fontAlgn="b"/>
+                      <a:r>
+                        <a:rPr lang="en-US" sz="1100" b="1" i="0" u="none" strike="noStrike">
+                          <a:solidFill>
+                            <a:srgbClr val="000000"/>
+                          </a:solidFill>
+                          <a:effectLst/>
+                          <a:latin typeface="Calibri" panose="020F0502020204030204" pitchFamily="34" charset="0"/>
+                        </a:rPr>
+                        <a:t>Count of loan_status</a:t>
+                      </a:r>
+                    </a:p>
+                  </a:txBody>
+                  <a:tcPr marL="6350" marR="6350" marT="6350" marB="0" anchor="b">
+                    <a:lnL>
+                      <a:noFill/>
+                    </a:lnL>
+                    <a:lnR>
+                      <a:noFill/>
+                    </a:lnR>
+                    <a:lnT>
+                      <a:noFill/>
+                    </a:lnT>
+                    <a:lnB w="6350" cap="flat" cmpd="sng" algn="ctr">
+                      <a:solidFill>
+                        <a:srgbClr val="8EA9DB"/>
+                      </a:solidFill>
+                      <a:prstDash val="solid"/>
+                      <a:round/>
+                      <a:headEnd type="none" w="med" len="med"/>
+                      <a:tailEnd type="none" w="med" len="med"/>
+                    </a:lnB>
+                    <a:solidFill>
+                      <a:srgbClr val="D9E1F2"/>
+                    </a:solidFill>
+                  </a:tcPr>
+                </a:tc>
+                <a:tc>
+                  <a:txBody>
+                    <a:bodyPr/>
+                    <a:lstStyle/>
+                    <a:p>
+                      <a:pPr algn="l" fontAlgn="b"/>
+                      <a:endParaRPr lang="en-US" sz="1100" b="0" i="0" u="none" strike="noStrike">
+                        <a:solidFill>
+                          <a:srgbClr val="000000"/>
+                        </a:solidFill>
+                        <a:effectLst/>
+                        <a:latin typeface="Calibri" panose="020F0502020204030204" pitchFamily="34" charset="0"/>
+                      </a:endParaRPr>
+                    </a:p>
+                  </a:txBody>
+                  <a:tcPr marL="6350" marR="6350" marT="6350" marB="0" anchor="b">
+                    <a:lnL>
+                      <a:noFill/>
+                    </a:lnL>
+                    <a:lnR>
+                      <a:noFill/>
+                    </a:lnR>
+                    <a:lnT>
+                      <a:noFill/>
+                    </a:lnT>
+                    <a:lnB>
+                      <a:noFill/>
+                    </a:lnB>
+                  </a:tcPr>
+                </a:tc>
+                <a:extLst>
+                  <a:ext uri="{0D108BD9-81ED-4DB2-BD59-A6C34878D82A}">
+                    <a16:rowId xmlns:a16="http://schemas.microsoft.com/office/drawing/2014/main" val="1375158905"/>
+                  </a:ext>
+                </a:extLst>
+              </a:tr>
+              <a:tr h="184150">
+                <a:tc>
+                  <a:txBody>
+                    <a:bodyPr/>
+                    <a:lstStyle/>
+                    <a:p>
+                      <a:pPr algn="l" fontAlgn="b"/>
+                      <a:r>
+                        <a:rPr lang="en-US" sz="1100" b="1" i="0" u="none" strike="noStrike">
+                          <a:solidFill>
+                            <a:srgbClr val="000000"/>
+                          </a:solidFill>
+                          <a:effectLst/>
+                          <a:latin typeface="Calibri" panose="020F0502020204030204" pitchFamily="34" charset="0"/>
+                        </a:rPr>
+                        <a:t>0</a:t>
+                      </a:r>
+                    </a:p>
+                  </a:txBody>
+                  <a:tcPr marL="6350" marR="6350" marT="6350" marB="0" anchor="b">
+                    <a:lnL>
+                      <a:noFill/>
+                    </a:lnL>
+                    <a:lnR>
+                      <a:noFill/>
+                    </a:lnR>
+                    <a:lnT w="6350" cap="flat" cmpd="sng" algn="ctr">
+                      <a:solidFill>
+                        <a:srgbClr val="8EA9DB"/>
+                      </a:solidFill>
+                      <a:prstDash val="solid"/>
+                      <a:round/>
+                      <a:headEnd type="none" w="med" len="med"/>
+                      <a:tailEnd type="none" w="med" len="med"/>
+                    </a:lnT>
+                    <a:lnB w="6350" cap="flat" cmpd="sng" algn="ctr">
+                      <a:solidFill>
+                        <a:srgbClr val="8EA9DB"/>
+                      </a:solidFill>
+                      <a:prstDash val="solid"/>
+                      <a:round/>
+                      <a:headEnd type="none" w="med" len="med"/>
+                      <a:tailEnd type="none" w="med" len="med"/>
+                    </a:lnB>
+                  </a:tcPr>
+                </a:tc>
+                <a:tc>
+                  <a:txBody>
+                    <a:bodyPr/>
+                    <a:lstStyle/>
+                    <a:p>
+                      <a:pPr algn="r" fontAlgn="b"/>
+                      <a:r>
+                        <a:rPr lang="en-US" sz="1100" b="1" i="0" u="none" strike="noStrike">
+                          <a:solidFill>
+                            <a:srgbClr val="000000"/>
+                          </a:solidFill>
+                          <a:effectLst/>
+                          <a:latin typeface="Calibri" panose="020F0502020204030204" pitchFamily="34" charset="0"/>
+                        </a:rPr>
+                        <a:t>1075</a:t>
+                      </a:r>
+                    </a:p>
+                  </a:txBody>
+                  <a:tcPr marL="6350" marR="6350" marT="6350" marB="0" anchor="b">
+                    <a:lnL>
+                      <a:noFill/>
+                    </a:lnL>
+                    <a:lnR>
+                      <a:noFill/>
+                    </a:lnR>
+                    <a:lnT w="6350" cap="flat" cmpd="sng" algn="ctr">
+                      <a:solidFill>
+                        <a:srgbClr val="8EA9DB"/>
+                      </a:solidFill>
+                      <a:prstDash val="solid"/>
+                      <a:round/>
+                      <a:headEnd type="none" w="med" len="med"/>
+                      <a:tailEnd type="none" w="med" len="med"/>
+                    </a:lnT>
+                    <a:lnB w="6350" cap="flat" cmpd="sng" algn="ctr">
+                      <a:solidFill>
+                        <a:srgbClr val="8EA9DB"/>
+                      </a:solidFill>
+                      <a:prstDash val="solid"/>
+                      <a:round/>
+                      <a:headEnd type="none" w="med" len="med"/>
+                      <a:tailEnd type="none" w="med" len="med"/>
+                    </a:lnB>
+                  </a:tcPr>
+                </a:tc>
+                <a:tc>
+                  <a:txBody>
+                    <a:bodyPr/>
+                    <a:lstStyle/>
+                    <a:p>
+                      <a:pPr algn="l" fontAlgn="b"/>
+                      <a:endParaRPr lang="en-US" sz="1100" b="0" i="0" u="none" strike="noStrike">
+                        <a:solidFill>
+                          <a:srgbClr val="000000"/>
+                        </a:solidFill>
+                        <a:effectLst/>
+                        <a:latin typeface="Calibri" panose="020F0502020204030204" pitchFamily="34" charset="0"/>
+                      </a:endParaRPr>
+                    </a:p>
+                  </a:txBody>
+                  <a:tcPr marL="6350" marR="6350" marT="6350" marB="0" anchor="b">
+                    <a:lnL>
+                      <a:noFill/>
+                    </a:lnL>
+                    <a:lnR>
+                      <a:noFill/>
+                    </a:lnR>
+                    <a:lnT>
+                      <a:noFill/>
+                    </a:lnT>
+                    <a:lnB>
+                      <a:noFill/>
+                    </a:lnB>
+                  </a:tcPr>
+                </a:tc>
+                <a:extLst>
+                  <a:ext uri="{0D108BD9-81ED-4DB2-BD59-A6C34878D82A}">
+                    <a16:rowId xmlns:a16="http://schemas.microsoft.com/office/drawing/2014/main" val="1202621451"/>
+                  </a:ext>
+                </a:extLst>
+              </a:tr>
+              <a:tr h="184150">
+                <a:tc>
+                  <a:txBody>
+                    <a:bodyPr/>
+                    <a:lstStyle/>
+                    <a:p>
+                      <a:pPr algn="l" fontAlgn="b"/>
+                      <a:r>
+                        <a:rPr lang="en-US" sz="1100" b="0" i="0" u="none" strike="noStrike">
+                          <a:solidFill>
+                            <a:srgbClr val="000000"/>
+                          </a:solidFill>
+                          <a:effectLst/>
+                          <a:latin typeface="Calibri" panose="020F0502020204030204" pitchFamily="34" charset="0"/>
+                        </a:rPr>
+                        <a:t>Charged Off</a:t>
+                      </a:r>
+                    </a:p>
+                  </a:txBody>
+                  <a:tcPr marL="95250" marR="6350" marT="6350" marB="0" anchor="b">
+                    <a:lnL>
+                      <a:noFill/>
+                    </a:lnL>
+                    <a:lnR>
+                      <a:noFill/>
+                    </a:lnR>
+                    <a:lnT w="6350" cap="flat" cmpd="sng" algn="ctr">
+                      <a:solidFill>
+                        <a:srgbClr val="8EA9DB"/>
+                      </a:solidFill>
+                      <a:prstDash val="solid"/>
+                      <a:round/>
+                      <a:headEnd type="none" w="med" len="med"/>
+                      <a:tailEnd type="none" w="med" len="med"/>
+                    </a:lnT>
+                    <a:lnB>
+                      <a:noFill/>
+                    </a:lnB>
+                  </a:tcPr>
+                </a:tc>
+                <a:tc>
+                  <a:txBody>
+                    <a:bodyPr/>
+                    <a:lstStyle/>
+                    <a:p>
+                      <a:pPr algn="r" fontAlgn="b"/>
+                      <a:r>
+                        <a:rPr lang="en-US" sz="1100" b="0" i="0" u="none" strike="noStrike">
+                          <a:solidFill>
+                            <a:srgbClr val="000000"/>
+                          </a:solidFill>
+                          <a:effectLst/>
+                          <a:latin typeface="Calibri" panose="020F0502020204030204" pitchFamily="34" charset="0"/>
+                        </a:rPr>
+                        <a:t>228</a:t>
+                      </a:r>
+                    </a:p>
+                  </a:txBody>
+                  <a:tcPr marL="6350" marR="6350" marT="6350" marB="0" anchor="b">
+                    <a:lnL>
+                      <a:noFill/>
+                    </a:lnL>
+                    <a:lnR>
+                      <a:noFill/>
+                    </a:lnR>
+                    <a:lnT w="6350" cap="flat" cmpd="sng" algn="ctr">
+                      <a:solidFill>
+                        <a:srgbClr val="8EA9DB"/>
+                      </a:solidFill>
+                      <a:prstDash val="solid"/>
+                      <a:round/>
+                      <a:headEnd type="none" w="med" len="med"/>
+                      <a:tailEnd type="none" w="med" len="med"/>
+                    </a:lnT>
+                    <a:lnB>
+                      <a:noFill/>
+                    </a:lnB>
+                  </a:tcPr>
+                </a:tc>
+                <a:tc>
+                  <a:txBody>
+                    <a:bodyPr/>
+                    <a:lstStyle/>
+                    <a:p>
+                      <a:pPr algn="r" fontAlgn="b"/>
+                      <a:r>
+                        <a:rPr lang="en-US" sz="1100" b="0" i="0" u="none" strike="noStrike">
+                          <a:solidFill>
+                            <a:srgbClr val="000000"/>
+                          </a:solidFill>
+                          <a:effectLst/>
+                          <a:latin typeface="Calibri" panose="020F0502020204030204" pitchFamily="34" charset="0"/>
+                        </a:rPr>
+                        <a:t>21.2093</a:t>
+                      </a:r>
+                    </a:p>
+                  </a:txBody>
+                  <a:tcPr marL="6350" marR="6350" marT="6350" marB="0" anchor="b">
+                    <a:lnL>
+                      <a:noFill/>
+                    </a:lnL>
+                    <a:lnR>
+                      <a:noFill/>
+                    </a:lnR>
+                    <a:lnT>
+                      <a:noFill/>
+                    </a:lnT>
+                    <a:lnB>
+                      <a:noFill/>
+                    </a:lnB>
+                  </a:tcPr>
+                </a:tc>
+                <a:extLst>
+                  <a:ext uri="{0D108BD9-81ED-4DB2-BD59-A6C34878D82A}">
+                    <a16:rowId xmlns:a16="http://schemas.microsoft.com/office/drawing/2014/main" val="1267801528"/>
+                  </a:ext>
+                </a:extLst>
+              </a:tr>
+              <a:tr h="184150">
+                <a:tc>
+                  <a:txBody>
+                    <a:bodyPr/>
+                    <a:lstStyle/>
+                    <a:p>
+                      <a:pPr algn="l" fontAlgn="b"/>
+                      <a:r>
+                        <a:rPr lang="en-US" sz="1100" b="0" i="0" u="none" strike="noStrike">
+                          <a:solidFill>
+                            <a:srgbClr val="000000"/>
+                          </a:solidFill>
+                          <a:effectLst/>
+                          <a:latin typeface="Calibri" panose="020F0502020204030204" pitchFamily="34" charset="0"/>
+                        </a:rPr>
+                        <a:t>Current</a:t>
+                      </a:r>
+                    </a:p>
+                  </a:txBody>
+                  <a:tcPr marL="95250" marR="6350" marT="6350" marB="0" anchor="b">
+                    <a:lnL>
+                      <a:noFill/>
+                    </a:lnL>
+                    <a:lnR>
+                      <a:noFill/>
+                    </a:lnR>
+                    <a:lnT>
+                      <a:noFill/>
+                    </a:lnT>
+                    <a:lnB>
+                      <a:noFill/>
+                    </a:lnB>
+                  </a:tcPr>
+                </a:tc>
+                <a:tc>
+                  <a:txBody>
+                    <a:bodyPr/>
+                    <a:lstStyle/>
+                    <a:p>
+                      <a:pPr algn="r" fontAlgn="b"/>
+                      <a:r>
+                        <a:rPr lang="en-US" sz="1100" b="0" i="0" u="none" strike="noStrike">
+                          <a:solidFill>
+                            <a:srgbClr val="000000"/>
+                          </a:solidFill>
+                          <a:effectLst/>
+                          <a:latin typeface="Calibri" panose="020F0502020204030204" pitchFamily="34" charset="0"/>
+                        </a:rPr>
+                        <a:t>42</a:t>
+                      </a:r>
+                    </a:p>
+                  </a:txBody>
+                  <a:tcPr marL="6350" marR="6350" marT="6350" marB="0" anchor="b">
+                    <a:lnL>
+                      <a:noFill/>
+                    </a:lnL>
+                    <a:lnR>
+                      <a:noFill/>
+                    </a:lnR>
+                    <a:lnT>
+                      <a:noFill/>
+                    </a:lnT>
+                    <a:lnB>
+                      <a:noFill/>
+                    </a:lnB>
+                  </a:tcPr>
+                </a:tc>
+                <a:tc>
+                  <a:txBody>
+                    <a:bodyPr/>
+                    <a:lstStyle/>
+                    <a:p>
+                      <a:pPr algn="l" fontAlgn="b"/>
+                      <a:endParaRPr lang="en-US" sz="1100" b="0" i="0" u="none" strike="noStrike">
+                        <a:solidFill>
+                          <a:srgbClr val="000000"/>
+                        </a:solidFill>
+                        <a:effectLst/>
+                        <a:latin typeface="Calibri" panose="020F0502020204030204" pitchFamily="34" charset="0"/>
+                      </a:endParaRPr>
+                    </a:p>
+                  </a:txBody>
+                  <a:tcPr marL="6350" marR="6350" marT="6350" marB="0" anchor="b">
+                    <a:lnL>
+                      <a:noFill/>
+                    </a:lnL>
+                    <a:lnR>
+                      <a:noFill/>
+                    </a:lnR>
+                    <a:lnT>
+                      <a:noFill/>
+                    </a:lnT>
+                    <a:lnB>
+                      <a:noFill/>
+                    </a:lnB>
+                  </a:tcPr>
+                </a:tc>
+                <a:extLst>
+                  <a:ext uri="{0D108BD9-81ED-4DB2-BD59-A6C34878D82A}">
+                    <a16:rowId xmlns:a16="http://schemas.microsoft.com/office/drawing/2014/main" val="1913091339"/>
+                  </a:ext>
+                </a:extLst>
+              </a:tr>
+              <a:tr h="184150">
+                <a:tc>
+                  <a:txBody>
+                    <a:bodyPr/>
+                    <a:lstStyle/>
+                    <a:p>
+                      <a:pPr algn="l" fontAlgn="b"/>
+                      <a:r>
+                        <a:rPr lang="en-US" sz="1100" b="0" i="0" u="none" strike="noStrike">
+                          <a:solidFill>
+                            <a:srgbClr val="000000"/>
+                          </a:solidFill>
+                          <a:effectLst/>
+                          <a:latin typeface="Calibri" panose="020F0502020204030204" pitchFamily="34" charset="0"/>
+                        </a:rPr>
+                        <a:t>Fully Paid</a:t>
+                      </a:r>
+                    </a:p>
+                  </a:txBody>
+                  <a:tcPr marL="95250" marR="6350" marT="6350" marB="0" anchor="b">
+                    <a:lnL>
+                      <a:noFill/>
+                    </a:lnL>
+                    <a:lnR>
+                      <a:noFill/>
+                    </a:lnR>
+                    <a:lnT>
+                      <a:noFill/>
+                    </a:lnT>
+                    <a:lnB>
+                      <a:noFill/>
+                    </a:lnB>
+                  </a:tcPr>
+                </a:tc>
+                <a:tc>
+                  <a:txBody>
+                    <a:bodyPr/>
+                    <a:lstStyle/>
+                    <a:p>
+                      <a:pPr algn="r" fontAlgn="b"/>
+                      <a:r>
+                        <a:rPr lang="en-US" sz="1100" b="0" i="0" u="none" strike="noStrike">
+                          <a:solidFill>
+                            <a:srgbClr val="000000"/>
+                          </a:solidFill>
+                          <a:effectLst/>
+                          <a:latin typeface="Calibri" panose="020F0502020204030204" pitchFamily="34" charset="0"/>
+                        </a:rPr>
+                        <a:t>805</a:t>
+                      </a:r>
+                    </a:p>
+                  </a:txBody>
+                  <a:tcPr marL="6350" marR="6350" marT="6350" marB="0" anchor="b">
+                    <a:lnL>
+                      <a:noFill/>
+                    </a:lnL>
+                    <a:lnR>
+                      <a:noFill/>
+                    </a:lnR>
+                    <a:lnT>
+                      <a:noFill/>
+                    </a:lnT>
+                    <a:lnB>
+                      <a:noFill/>
+                    </a:lnB>
+                  </a:tcPr>
+                </a:tc>
+                <a:tc>
+                  <a:txBody>
+                    <a:bodyPr/>
+                    <a:lstStyle/>
+                    <a:p>
+                      <a:pPr algn="l" fontAlgn="b"/>
+                      <a:endParaRPr lang="en-US" sz="1100" b="0" i="0" u="none" strike="noStrike">
+                        <a:solidFill>
+                          <a:srgbClr val="000000"/>
+                        </a:solidFill>
+                        <a:effectLst/>
+                        <a:latin typeface="Calibri" panose="020F0502020204030204" pitchFamily="34" charset="0"/>
+                      </a:endParaRPr>
+                    </a:p>
+                  </a:txBody>
+                  <a:tcPr marL="6350" marR="6350" marT="6350" marB="0" anchor="b">
+                    <a:lnL>
+                      <a:noFill/>
+                    </a:lnL>
+                    <a:lnR>
+                      <a:noFill/>
+                    </a:lnR>
+                    <a:lnT>
+                      <a:noFill/>
+                    </a:lnT>
+                    <a:lnB>
+                      <a:noFill/>
+                    </a:lnB>
+                  </a:tcPr>
+                </a:tc>
+                <a:extLst>
+                  <a:ext uri="{0D108BD9-81ED-4DB2-BD59-A6C34878D82A}">
+                    <a16:rowId xmlns:a16="http://schemas.microsoft.com/office/drawing/2014/main" val="1411560611"/>
+                  </a:ext>
+                </a:extLst>
+              </a:tr>
+              <a:tr h="184150">
+                <a:tc>
+                  <a:txBody>
+                    <a:bodyPr/>
+                    <a:lstStyle/>
+                    <a:p>
+                      <a:pPr algn="l" fontAlgn="b"/>
+                      <a:r>
+                        <a:rPr lang="en-US" sz="1100" b="1" i="0" u="none" strike="noStrike">
+                          <a:solidFill>
+                            <a:srgbClr val="000000"/>
+                          </a:solidFill>
+                          <a:effectLst/>
+                          <a:latin typeface="Calibri" panose="020F0502020204030204" pitchFamily="34" charset="0"/>
+                        </a:rPr>
+                        <a:t>1</a:t>
+                      </a:r>
+                    </a:p>
+                  </a:txBody>
+                  <a:tcPr marL="6350" marR="6350" marT="6350" marB="0" anchor="b">
+                    <a:lnL>
+                      <a:noFill/>
+                    </a:lnL>
+                    <a:lnR>
+                      <a:noFill/>
+                    </a:lnR>
+                    <a:lnT>
+                      <a:noFill/>
+                    </a:lnT>
+                    <a:lnB w="6350" cap="flat" cmpd="sng" algn="ctr">
+                      <a:solidFill>
+                        <a:srgbClr val="8EA9DB"/>
+                      </a:solidFill>
+                      <a:prstDash val="solid"/>
+                      <a:round/>
+                      <a:headEnd type="none" w="med" len="med"/>
+                      <a:tailEnd type="none" w="med" len="med"/>
+                    </a:lnB>
+                  </a:tcPr>
+                </a:tc>
+                <a:tc>
+                  <a:txBody>
+                    <a:bodyPr/>
+                    <a:lstStyle/>
+                    <a:p>
+                      <a:pPr algn="r" fontAlgn="b"/>
+                      <a:r>
+                        <a:rPr lang="en-US" sz="1100" b="1" i="0" u="none" strike="noStrike">
+                          <a:solidFill>
+                            <a:srgbClr val="000000"/>
+                          </a:solidFill>
+                          <a:effectLst/>
+                          <a:latin typeface="Calibri" panose="020F0502020204030204" pitchFamily="34" charset="0"/>
+                        </a:rPr>
+                        <a:t>7823</a:t>
+                      </a:r>
+                    </a:p>
+                  </a:txBody>
+                  <a:tcPr marL="6350" marR="6350" marT="6350" marB="0" anchor="b">
+                    <a:lnL>
+                      <a:noFill/>
+                    </a:lnL>
+                    <a:lnR>
+                      <a:noFill/>
+                    </a:lnR>
+                    <a:lnT>
+                      <a:noFill/>
+                    </a:lnT>
+                    <a:lnB w="6350" cap="flat" cmpd="sng" algn="ctr">
+                      <a:solidFill>
+                        <a:srgbClr val="8EA9DB"/>
+                      </a:solidFill>
+                      <a:prstDash val="solid"/>
+                      <a:round/>
+                      <a:headEnd type="none" w="med" len="med"/>
+                      <a:tailEnd type="none" w="med" len="med"/>
+                    </a:lnB>
+                  </a:tcPr>
+                </a:tc>
+                <a:tc>
+                  <a:txBody>
+                    <a:bodyPr/>
+                    <a:lstStyle/>
+                    <a:p>
+                      <a:pPr algn="l" fontAlgn="b"/>
+                      <a:endParaRPr lang="en-US" sz="1100" b="0" i="0" u="none" strike="noStrike">
+                        <a:solidFill>
+                          <a:srgbClr val="000000"/>
+                        </a:solidFill>
+                        <a:effectLst/>
+                        <a:latin typeface="Calibri" panose="020F0502020204030204" pitchFamily="34" charset="0"/>
+                      </a:endParaRPr>
+                    </a:p>
+                  </a:txBody>
+                  <a:tcPr marL="6350" marR="6350" marT="6350" marB="0" anchor="b">
+                    <a:lnL>
+                      <a:noFill/>
+                    </a:lnL>
+                    <a:lnR>
+                      <a:noFill/>
+                    </a:lnR>
+                    <a:lnT>
+                      <a:noFill/>
+                    </a:lnT>
+                    <a:lnB>
+                      <a:noFill/>
+                    </a:lnB>
+                  </a:tcPr>
+                </a:tc>
+                <a:extLst>
+                  <a:ext uri="{0D108BD9-81ED-4DB2-BD59-A6C34878D82A}">
+                    <a16:rowId xmlns:a16="http://schemas.microsoft.com/office/drawing/2014/main" val="3177830650"/>
+                  </a:ext>
+                </a:extLst>
+              </a:tr>
+              <a:tr h="184150">
+                <a:tc>
+                  <a:txBody>
+                    <a:bodyPr/>
+                    <a:lstStyle/>
+                    <a:p>
+                      <a:pPr algn="l" fontAlgn="b"/>
+                      <a:r>
+                        <a:rPr lang="en-US" sz="1100" b="0" i="0" u="none" strike="noStrike">
+                          <a:solidFill>
+                            <a:srgbClr val="000000"/>
+                          </a:solidFill>
+                          <a:effectLst/>
+                          <a:latin typeface="Calibri" panose="020F0502020204030204" pitchFamily="34" charset="0"/>
+                        </a:rPr>
+                        <a:t>Charged Off</a:t>
+                      </a:r>
+                    </a:p>
+                  </a:txBody>
+                  <a:tcPr marL="95250" marR="6350" marT="6350" marB="0" anchor="b">
+                    <a:lnL>
+                      <a:noFill/>
+                    </a:lnL>
+                    <a:lnR>
+                      <a:noFill/>
+                    </a:lnR>
+                    <a:lnT w="6350" cap="flat" cmpd="sng" algn="ctr">
+                      <a:solidFill>
+                        <a:srgbClr val="8EA9DB"/>
+                      </a:solidFill>
+                      <a:prstDash val="solid"/>
+                      <a:round/>
+                      <a:headEnd type="none" w="med" len="med"/>
+                      <a:tailEnd type="none" w="med" len="med"/>
+                    </a:lnT>
+                    <a:lnB>
+                      <a:noFill/>
+                    </a:lnB>
+                  </a:tcPr>
+                </a:tc>
+                <a:tc>
+                  <a:txBody>
+                    <a:bodyPr/>
+                    <a:lstStyle/>
+                    <a:p>
+                      <a:pPr algn="r" fontAlgn="b"/>
+                      <a:r>
+                        <a:rPr lang="en-US" sz="1100" b="0" i="0" u="none" strike="noStrike">
+                          <a:solidFill>
+                            <a:srgbClr val="000000"/>
+                          </a:solidFill>
+                          <a:effectLst/>
+                          <a:latin typeface="Calibri" panose="020F0502020204030204" pitchFamily="34" charset="0"/>
+                        </a:rPr>
+                        <a:t>1095</a:t>
+                      </a:r>
+                    </a:p>
+                  </a:txBody>
+                  <a:tcPr marL="6350" marR="6350" marT="6350" marB="0" anchor="b">
+                    <a:lnL>
+                      <a:noFill/>
+                    </a:lnL>
+                    <a:lnR>
+                      <a:noFill/>
+                    </a:lnR>
+                    <a:lnT w="6350" cap="flat" cmpd="sng" algn="ctr">
+                      <a:solidFill>
+                        <a:srgbClr val="8EA9DB"/>
+                      </a:solidFill>
+                      <a:prstDash val="solid"/>
+                      <a:round/>
+                      <a:headEnd type="none" w="med" len="med"/>
+                      <a:tailEnd type="none" w="med" len="med"/>
+                    </a:lnT>
+                    <a:lnB>
+                      <a:noFill/>
+                    </a:lnB>
+                  </a:tcPr>
+                </a:tc>
+                <a:tc>
+                  <a:txBody>
+                    <a:bodyPr/>
+                    <a:lstStyle/>
+                    <a:p>
+                      <a:pPr algn="r" fontAlgn="b"/>
+                      <a:r>
+                        <a:rPr lang="en-US" sz="1100" b="0" i="0" u="none" strike="noStrike">
+                          <a:solidFill>
+                            <a:srgbClr val="000000"/>
+                          </a:solidFill>
+                          <a:effectLst/>
+                          <a:latin typeface="Calibri" panose="020F0502020204030204" pitchFamily="34" charset="0"/>
+                        </a:rPr>
+                        <a:t>13.99719</a:t>
+                      </a:r>
+                    </a:p>
+                  </a:txBody>
+                  <a:tcPr marL="6350" marR="6350" marT="6350" marB="0" anchor="b">
+                    <a:lnL>
+                      <a:noFill/>
+                    </a:lnL>
+                    <a:lnR>
+                      <a:noFill/>
+                    </a:lnR>
+                    <a:lnT>
+                      <a:noFill/>
+                    </a:lnT>
+                    <a:lnB>
+                      <a:noFill/>
+                    </a:lnB>
+                  </a:tcPr>
+                </a:tc>
+                <a:extLst>
+                  <a:ext uri="{0D108BD9-81ED-4DB2-BD59-A6C34878D82A}">
+                    <a16:rowId xmlns:a16="http://schemas.microsoft.com/office/drawing/2014/main" val="740603278"/>
+                  </a:ext>
+                </a:extLst>
+              </a:tr>
+              <a:tr h="184150">
+                <a:tc>
+                  <a:txBody>
+                    <a:bodyPr/>
+                    <a:lstStyle/>
+                    <a:p>
+                      <a:pPr algn="l" fontAlgn="b"/>
+                      <a:r>
+                        <a:rPr lang="en-US" sz="1100" b="0" i="0" u="none" strike="noStrike">
+                          <a:solidFill>
+                            <a:srgbClr val="000000"/>
+                          </a:solidFill>
+                          <a:effectLst/>
+                          <a:latin typeface="Calibri" panose="020F0502020204030204" pitchFamily="34" charset="0"/>
+                        </a:rPr>
+                        <a:t>Current</a:t>
+                      </a:r>
+                    </a:p>
+                  </a:txBody>
+                  <a:tcPr marL="95250" marR="6350" marT="6350" marB="0" anchor="b">
+                    <a:lnL>
+                      <a:noFill/>
+                    </a:lnL>
+                    <a:lnR>
+                      <a:noFill/>
+                    </a:lnR>
+                    <a:lnT>
+                      <a:noFill/>
+                    </a:lnT>
+                    <a:lnB>
+                      <a:noFill/>
+                    </a:lnB>
+                  </a:tcPr>
+                </a:tc>
+                <a:tc>
+                  <a:txBody>
+                    <a:bodyPr/>
+                    <a:lstStyle/>
+                    <a:p>
+                      <a:pPr algn="r" fontAlgn="b"/>
+                      <a:r>
+                        <a:rPr lang="en-US" sz="1100" b="0" i="0" u="none" strike="noStrike">
+                          <a:solidFill>
+                            <a:srgbClr val="000000"/>
+                          </a:solidFill>
+                          <a:effectLst/>
+                          <a:latin typeface="Calibri" panose="020F0502020204030204" pitchFamily="34" charset="0"/>
+                        </a:rPr>
+                        <a:t>146</a:t>
+                      </a:r>
+                    </a:p>
+                  </a:txBody>
+                  <a:tcPr marL="6350" marR="6350" marT="6350" marB="0" anchor="b">
+                    <a:lnL>
+                      <a:noFill/>
+                    </a:lnL>
+                    <a:lnR>
+                      <a:noFill/>
+                    </a:lnR>
+                    <a:lnT>
+                      <a:noFill/>
+                    </a:lnT>
+                    <a:lnB>
+                      <a:noFill/>
+                    </a:lnB>
+                  </a:tcPr>
+                </a:tc>
+                <a:tc>
+                  <a:txBody>
+                    <a:bodyPr/>
+                    <a:lstStyle/>
+                    <a:p>
+                      <a:pPr algn="l" fontAlgn="b"/>
+                      <a:endParaRPr lang="en-US" sz="1100" b="0" i="0" u="none" strike="noStrike">
+                        <a:solidFill>
+                          <a:srgbClr val="000000"/>
+                        </a:solidFill>
+                        <a:effectLst/>
+                        <a:latin typeface="Calibri" panose="020F0502020204030204" pitchFamily="34" charset="0"/>
+                      </a:endParaRPr>
+                    </a:p>
+                  </a:txBody>
+                  <a:tcPr marL="6350" marR="6350" marT="6350" marB="0" anchor="b">
+                    <a:lnL>
+                      <a:noFill/>
+                    </a:lnL>
+                    <a:lnR>
+                      <a:noFill/>
+                    </a:lnR>
+                    <a:lnT>
+                      <a:noFill/>
+                    </a:lnT>
+                    <a:lnB>
+                      <a:noFill/>
+                    </a:lnB>
+                  </a:tcPr>
+                </a:tc>
+                <a:extLst>
+                  <a:ext uri="{0D108BD9-81ED-4DB2-BD59-A6C34878D82A}">
+                    <a16:rowId xmlns:a16="http://schemas.microsoft.com/office/drawing/2014/main" val="4180049123"/>
+                  </a:ext>
+                </a:extLst>
+              </a:tr>
+              <a:tr h="184150">
+                <a:tc>
+                  <a:txBody>
+                    <a:bodyPr/>
+                    <a:lstStyle/>
+                    <a:p>
+                      <a:pPr algn="l" fontAlgn="b"/>
+                      <a:r>
+                        <a:rPr lang="en-US" sz="1100" b="0" i="0" u="none" strike="noStrike">
+                          <a:solidFill>
+                            <a:srgbClr val="000000"/>
+                          </a:solidFill>
+                          <a:effectLst/>
+                          <a:latin typeface="Calibri" panose="020F0502020204030204" pitchFamily="34" charset="0"/>
+                        </a:rPr>
+                        <a:t>Fully Paid</a:t>
+                      </a:r>
+                    </a:p>
+                  </a:txBody>
+                  <a:tcPr marL="95250" marR="6350" marT="6350" marB="0" anchor="b">
+                    <a:lnL>
+                      <a:noFill/>
+                    </a:lnL>
+                    <a:lnR>
+                      <a:noFill/>
+                    </a:lnR>
+                    <a:lnT>
+                      <a:noFill/>
+                    </a:lnT>
+                    <a:lnB>
+                      <a:noFill/>
+                    </a:lnB>
+                  </a:tcPr>
+                </a:tc>
+                <a:tc>
+                  <a:txBody>
+                    <a:bodyPr/>
+                    <a:lstStyle/>
+                    <a:p>
+                      <a:pPr algn="r" fontAlgn="b"/>
+                      <a:r>
+                        <a:rPr lang="en-US" sz="1100" b="0" i="0" u="none" strike="noStrike">
+                          <a:solidFill>
+                            <a:srgbClr val="000000"/>
+                          </a:solidFill>
+                          <a:effectLst/>
+                          <a:latin typeface="Calibri" panose="020F0502020204030204" pitchFamily="34" charset="0"/>
+                        </a:rPr>
+                        <a:t>6582</a:t>
+                      </a:r>
+                    </a:p>
+                  </a:txBody>
+                  <a:tcPr marL="6350" marR="6350" marT="6350" marB="0" anchor="b">
+                    <a:lnL>
+                      <a:noFill/>
+                    </a:lnL>
+                    <a:lnR>
+                      <a:noFill/>
+                    </a:lnR>
+                    <a:lnT>
+                      <a:noFill/>
+                    </a:lnT>
+                    <a:lnB>
+                      <a:noFill/>
+                    </a:lnB>
+                  </a:tcPr>
+                </a:tc>
+                <a:tc>
+                  <a:txBody>
+                    <a:bodyPr/>
+                    <a:lstStyle/>
+                    <a:p>
+                      <a:pPr algn="l" fontAlgn="b"/>
+                      <a:endParaRPr lang="en-US" sz="1100" b="0" i="0" u="none" strike="noStrike">
+                        <a:solidFill>
+                          <a:srgbClr val="000000"/>
+                        </a:solidFill>
+                        <a:effectLst/>
+                        <a:latin typeface="Calibri" panose="020F0502020204030204" pitchFamily="34" charset="0"/>
+                      </a:endParaRPr>
+                    </a:p>
+                  </a:txBody>
+                  <a:tcPr marL="6350" marR="6350" marT="6350" marB="0" anchor="b">
+                    <a:lnL>
+                      <a:noFill/>
+                    </a:lnL>
+                    <a:lnR>
+                      <a:noFill/>
+                    </a:lnR>
+                    <a:lnT>
+                      <a:noFill/>
+                    </a:lnT>
+                    <a:lnB>
+                      <a:noFill/>
+                    </a:lnB>
+                  </a:tcPr>
+                </a:tc>
+                <a:extLst>
+                  <a:ext uri="{0D108BD9-81ED-4DB2-BD59-A6C34878D82A}">
+                    <a16:rowId xmlns:a16="http://schemas.microsoft.com/office/drawing/2014/main" val="3193536462"/>
+                  </a:ext>
+                </a:extLst>
+              </a:tr>
+              <a:tr h="184150">
+                <a:tc>
+                  <a:txBody>
+                    <a:bodyPr/>
+                    <a:lstStyle/>
+                    <a:p>
+                      <a:pPr algn="l" fontAlgn="b"/>
+                      <a:r>
+                        <a:rPr lang="en-US" sz="1100" b="1" i="0" u="none" strike="noStrike">
+                          <a:solidFill>
+                            <a:srgbClr val="000000"/>
+                          </a:solidFill>
+                          <a:effectLst/>
+                          <a:latin typeface="Calibri" panose="020F0502020204030204" pitchFamily="34" charset="0"/>
+                        </a:rPr>
+                        <a:t>2</a:t>
+                      </a:r>
+                    </a:p>
+                  </a:txBody>
+                  <a:tcPr marL="6350" marR="6350" marT="6350" marB="0" anchor="b">
+                    <a:lnL>
+                      <a:noFill/>
+                    </a:lnL>
+                    <a:lnR>
+                      <a:noFill/>
+                    </a:lnR>
+                    <a:lnT>
+                      <a:noFill/>
+                    </a:lnT>
+                    <a:lnB w="6350" cap="flat" cmpd="sng" algn="ctr">
+                      <a:solidFill>
+                        <a:srgbClr val="8EA9DB"/>
+                      </a:solidFill>
+                      <a:prstDash val="solid"/>
+                      <a:round/>
+                      <a:headEnd type="none" w="med" len="med"/>
+                      <a:tailEnd type="none" w="med" len="med"/>
+                    </a:lnB>
+                  </a:tcPr>
+                </a:tc>
+                <a:tc>
+                  <a:txBody>
+                    <a:bodyPr/>
+                    <a:lstStyle/>
+                    <a:p>
+                      <a:pPr algn="r" fontAlgn="b"/>
+                      <a:r>
+                        <a:rPr lang="en-US" sz="1100" b="1" i="0" u="none" strike="noStrike">
+                          <a:solidFill>
+                            <a:srgbClr val="000000"/>
+                          </a:solidFill>
+                          <a:effectLst/>
+                          <a:latin typeface="Calibri" panose="020F0502020204030204" pitchFamily="34" charset="0"/>
+                        </a:rPr>
+                        <a:t>4388</a:t>
+                      </a:r>
+                    </a:p>
+                  </a:txBody>
+                  <a:tcPr marL="6350" marR="6350" marT="6350" marB="0" anchor="b">
+                    <a:lnL>
+                      <a:noFill/>
+                    </a:lnL>
+                    <a:lnR>
+                      <a:noFill/>
+                    </a:lnR>
+                    <a:lnT>
+                      <a:noFill/>
+                    </a:lnT>
+                    <a:lnB w="6350" cap="flat" cmpd="sng" algn="ctr">
+                      <a:solidFill>
+                        <a:srgbClr val="8EA9DB"/>
+                      </a:solidFill>
+                      <a:prstDash val="solid"/>
+                      <a:round/>
+                      <a:headEnd type="none" w="med" len="med"/>
+                      <a:tailEnd type="none" w="med" len="med"/>
+                    </a:lnB>
+                  </a:tcPr>
+                </a:tc>
+                <a:tc>
+                  <a:txBody>
+                    <a:bodyPr/>
+                    <a:lstStyle/>
+                    <a:p>
+                      <a:pPr algn="l" fontAlgn="b"/>
+                      <a:endParaRPr lang="en-US" sz="1100" b="0" i="0" u="none" strike="noStrike">
+                        <a:solidFill>
+                          <a:srgbClr val="000000"/>
+                        </a:solidFill>
+                        <a:effectLst/>
+                        <a:latin typeface="Calibri" panose="020F0502020204030204" pitchFamily="34" charset="0"/>
+                      </a:endParaRPr>
+                    </a:p>
+                  </a:txBody>
+                  <a:tcPr marL="6350" marR="6350" marT="6350" marB="0" anchor="b">
+                    <a:lnL>
+                      <a:noFill/>
+                    </a:lnL>
+                    <a:lnR>
+                      <a:noFill/>
+                    </a:lnR>
+                    <a:lnT>
+                      <a:noFill/>
+                    </a:lnT>
+                    <a:lnB>
+                      <a:noFill/>
+                    </a:lnB>
+                  </a:tcPr>
+                </a:tc>
+                <a:extLst>
+                  <a:ext uri="{0D108BD9-81ED-4DB2-BD59-A6C34878D82A}">
+                    <a16:rowId xmlns:a16="http://schemas.microsoft.com/office/drawing/2014/main" val="3745007916"/>
+                  </a:ext>
+                </a:extLst>
+              </a:tr>
+              <a:tr h="184150">
+                <a:tc>
+                  <a:txBody>
+                    <a:bodyPr/>
+                    <a:lstStyle/>
+                    <a:p>
+                      <a:pPr algn="l" fontAlgn="b"/>
+                      <a:r>
+                        <a:rPr lang="en-US" sz="1100" b="0" i="0" u="none" strike="noStrike">
+                          <a:solidFill>
+                            <a:srgbClr val="000000"/>
+                          </a:solidFill>
+                          <a:effectLst/>
+                          <a:latin typeface="Calibri" panose="020F0502020204030204" pitchFamily="34" charset="0"/>
+                        </a:rPr>
+                        <a:t>Charged Off</a:t>
+                      </a:r>
+                    </a:p>
+                  </a:txBody>
+                  <a:tcPr marL="95250" marR="6350" marT="6350" marB="0" anchor="b">
+                    <a:lnL>
+                      <a:noFill/>
+                    </a:lnL>
+                    <a:lnR>
+                      <a:noFill/>
+                    </a:lnR>
+                    <a:lnT w="6350" cap="flat" cmpd="sng" algn="ctr">
+                      <a:solidFill>
+                        <a:srgbClr val="8EA9DB"/>
+                      </a:solidFill>
+                      <a:prstDash val="solid"/>
+                      <a:round/>
+                      <a:headEnd type="none" w="med" len="med"/>
+                      <a:tailEnd type="none" w="med" len="med"/>
+                    </a:lnT>
+                    <a:lnB>
+                      <a:noFill/>
+                    </a:lnB>
+                  </a:tcPr>
+                </a:tc>
+                <a:tc>
+                  <a:txBody>
+                    <a:bodyPr/>
+                    <a:lstStyle/>
+                    <a:p>
+                      <a:pPr algn="r" fontAlgn="b"/>
+                      <a:r>
+                        <a:rPr lang="en-US" sz="1100" b="0" i="0" u="none" strike="noStrike">
+                          <a:solidFill>
+                            <a:srgbClr val="000000"/>
+                          </a:solidFill>
+                          <a:effectLst/>
+                          <a:latin typeface="Calibri" panose="020F0502020204030204" pitchFamily="34" charset="0"/>
+                        </a:rPr>
+                        <a:t>567</a:t>
+                      </a:r>
+                    </a:p>
+                  </a:txBody>
+                  <a:tcPr marL="6350" marR="6350" marT="6350" marB="0" anchor="b">
+                    <a:lnL>
+                      <a:noFill/>
+                    </a:lnL>
+                    <a:lnR>
+                      <a:noFill/>
+                    </a:lnR>
+                    <a:lnT w="6350" cap="flat" cmpd="sng" algn="ctr">
+                      <a:solidFill>
+                        <a:srgbClr val="8EA9DB"/>
+                      </a:solidFill>
+                      <a:prstDash val="solid"/>
+                      <a:round/>
+                      <a:headEnd type="none" w="med" len="med"/>
+                      <a:tailEnd type="none" w="med" len="med"/>
+                    </a:lnT>
+                    <a:lnB>
+                      <a:noFill/>
+                    </a:lnB>
+                  </a:tcPr>
+                </a:tc>
+                <a:tc>
+                  <a:txBody>
+                    <a:bodyPr/>
+                    <a:lstStyle/>
+                    <a:p>
+                      <a:pPr algn="l" fontAlgn="b"/>
+                      <a:endParaRPr lang="en-US" sz="1100" b="0" i="0" u="none" strike="noStrike">
+                        <a:solidFill>
+                          <a:srgbClr val="000000"/>
+                        </a:solidFill>
+                        <a:effectLst/>
+                        <a:latin typeface="Calibri" panose="020F0502020204030204" pitchFamily="34" charset="0"/>
+                      </a:endParaRPr>
+                    </a:p>
+                  </a:txBody>
+                  <a:tcPr marL="6350" marR="6350" marT="6350" marB="0" anchor="b">
+                    <a:lnL>
+                      <a:noFill/>
+                    </a:lnL>
+                    <a:lnR>
+                      <a:noFill/>
+                    </a:lnR>
+                    <a:lnT>
+                      <a:noFill/>
+                    </a:lnT>
+                    <a:lnB>
+                      <a:noFill/>
+                    </a:lnB>
+                  </a:tcPr>
+                </a:tc>
+                <a:extLst>
+                  <a:ext uri="{0D108BD9-81ED-4DB2-BD59-A6C34878D82A}">
+                    <a16:rowId xmlns:a16="http://schemas.microsoft.com/office/drawing/2014/main" val="3101708093"/>
+                  </a:ext>
+                </a:extLst>
+              </a:tr>
+              <a:tr h="184150">
+                <a:tc>
+                  <a:txBody>
+                    <a:bodyPr/>
+                    <a:lstStyle/>
+                    <a:p>
+                      <a:pPr algn="l" fontAlgn="b"/>
+                      <a:r>
+                        <a:rPr lang="en-US" sz="1100" b="0" i="0" u="none" strike="noStrike">
+                          <a:solidFill>
+                            <a:srgbClr val="000000"/>
+                          </a:solidFill>
+                          <a:effectLst/>
+                          <a:latin typeface="Calibri" panose="020F0502020204030204" pitchFamily="34" charset="0"/>
+                        </a:rPr>
+                        <a:t>Current</a:t>
+                      </a:r>
+                    </a:p>
+                  </a:txBody>
+                  <a:tcPr marL="95250" marR="6350" marT="6350" marB="0" anchor="b">
+                    <a:lnL>
+                      <a:noFill/>
+                    </a:lnL>
+                    <a:lnR>
+                      <a:noFill/>
+                    </a:lnR>
+                    <a:lnT>
+                      <a:noFill/>
+                    </a:lnT>
+                    <a:lnB>
+                      <a:noFill/>
+                    </a:lnB>
+                  </a:tcPr>
+                </a:tc>
+                <a:tc>
+                  <a:txBody>
+                    <a:bodyPr/>
+                    <a:lstStyle/>
+                    <a:p>
+                      <a:pPr algn="r" fontAlgn="b"/>
+                      <a:r>
+                        <a:rPr lang="en-US" sz="1100" b="0" i="0" u="none" strike="noStrike">
+                          <a:solidFill>
+                            <a:srgbClr val="000000"/>
+                          </a:solidFill>
+                          <a:effectLst/>
+                          <a:latin typeface="Calibri" panose="020F0502020204030204" pitchFamily="34" charset="0"/>
+                        </a:rPr>
+                        <a:t>97</a:t>
+                      </a:r>
+                    </a:p>
+                  </a:txBody>
+                  <a:tcPr marL="6350" marR="6350" marT="6350" marB="0" anchor="b">
+                    <a:lnL>
+                      <a:noFill/>
+                    </a:lnL>
+                    <a:lnR>
+                      <a:noFill/>
+                    </a:lnR>
+                    <a:lnT>
+                      <a:noFill/>
+                    </a:lnT>
+                    <a:lnB>
+                      <a:noFill/>
+                    </a:lnB>
+                  </a:tcPr>
+                </a:tc>
+                <a:tc>
+                  <a:txBody>
+                    <a:bodyPr/>
+                    <a:lstStyle/>
+                    <a:p>
+                      <a:pPr algn="l" fontAlgn="b"/>
+                      <a:endParaRPr lang="en-US" sz="1100" b="0" i="0" u="none" strike="noStrike">
+                        <a:solidFill>
+                          <a:srgbClr val="000000"/>
+                        </a:solidFill>
+                        <a:effectLst/>
+                        <a:latin typeface="Calibri" panose="020F0502020204030204" pitchFamily="34" charset="0"/>
+                      </a:endParaRPr>
+                    </a:p>
+                  </a:txBody>
+                  <a:tcPr marL="6350" marR="6350" marT="6350" marB="0" anchor="b">
+                    <a:lnL>
+                      <a:noFill/>
+                    </a:lnL>
+                    <a:lnR>
+                      <a:noFill/>
+                    </a:lnR>
+                    <a:lnT>
+                      <a:noFill/>
+                    </a:lnT>
+                    <a:lnB>
+                      <a:noFill/>
+                    </a:lnB>
+                  </a:tcPr>
+                </a:tc>
+                <a:extLst>
+                  <a:ext uri="{0D108BD9-81ED-4DB2-BD59-A6C34878D82A}">
+                    <a16:rowId xmlns:a16="http://schemas.microsoft.com/office/drawing/2014/main" val="1790317716"/>
+                  </a:ext>
+                </a:extLst>
+              </a:tr>
+              <a:tr h="184150">
+                <a:tc>
+                  <a:txBody>
+                    <a:bodyPr/>
+                    <a:lstStyle/>
+                    <a:p>
+                      <a:pPr algn="l" fontAlgn="b"/>
+                      <a:r>
+                        <a:rPr lang="en-US" sz="1100" b="0" i="0" u="none" strike="noStrike">
+                          <a:solidFill>
+                            <a:srgbClr val="000000"/>
+                          </a:solidFill>
+                          <a:effectLst/>
+                          <a:latin typeface="Calibri" panose="020F0502020204030204" pitchFamily="34" charset="0"/>
+                        </a:rPr>
+                        <a:t>Fully Paid</a:t>
+                      </a:r>
+                    </a:p>
+                  </a:txBody>
+                  <a:tcPr marL="95250" marR="6350" marT="6350" marB="0" anchor="b">
+                    <a:lnL>
+                      <a:noFill/>
+                    </a:lnL>
+                    <a:lnR>
+                      <a:noFill/>
+                    </a:lnR>
+                    <a:lnT>
+                      <a:noFill/>
+                    </a:lnT>
+                    <a:lnB>
+                      <a:noFill/>
+                    </a:lnB>
+                  </a:tcPr>
+                </a:tc>
+                <a:tc>
+                  <a:txBody>
+                    <a:bodyPr/>
+                    <a:lstStyle/>
+                    <a:p>
+                      <a:pPr algn="r" fontAlgn="b"/>
+                      <a:r>
+                        <a:rPr lang="en-US" sz="1100" b="0" i="0" u="none" strike="noStrike">
+                          <a:solidFill>
+                            <a:srgbClr val="000000"/>
+                          </a:solidFill>
+                          <a:effectLst/>
+                          <a:latin typeface="Calibri" panose="020F0502020204030204" pitchFamily="34" charset="0"/>
+                        </a:rPr>
+                        <a:t>3724</a:t>
+                      </a:r>
+                    </a:p>
+                  </a:txBody>
+                  <a:tcPr marL="6350" marR="6350" marT="6350" marB="0" anchor="b">
+                    <a:lnL>
+                      <a:noFill/>
+                    </a:lnL>
+                    <a:lnR>
+                      <a:noFill/>
+                    </a:lnR>
+                    <a:lnT>
+                      <a:noFill/>
+                    </a:lnT>
+                    <a:lnB>
+                      <a:noFill/>
+                    </a:lnB>
+                  </a:tcPr>
+                </a:tc>
+                <a:tc>
+                  <a:txBody>
+                    <a:bodyPr/>
+                    <a:lstStyle/>
+                    <a:p>
+                      <a:pPr algn="l" fontAlgn="b"/>
+                      <a:endParaRPr lang="en-US" sz="1100" b="0" i="0" u="none" strike="noStrike">
+                        <a:solidFill>
+                          <a:srgbClr val="000000"/>
+                        </a:solidFill>
+                        <a:effectLst/>
+                        <a:latin typeface="Calibri" panose="020F0502020204030204" pitchFamily="34" charset="0"/>
+                      </a:endParaRPr>
+                    </a:p>
+                  </a:txBody>
+                  <a:tcPr marL="6350" marR="6350" marT="6350" marB="0" anchor="b">
+                    <a:lnL>
+                      <a:noFill/>
+                    </a:lnL>
+                    <a:lnR>
+                      <a:noFill/>
+                    </a:lnR>
+                    <a:lnT>
+                      <a:noFill/>
+                    </a:lnT>
+                    <a:lnB>
+                      <a:noFill/>
+                    </a:lnB>
+                  </a:tcPr>
+                </a:tc>
+                <a:extLst>
+                  <a:ext uri="{0D108BD9-81ED-4DB2-BD59-A6C34878D82A}">
+                    <a16:rowId xmlns:a16="http://schemas.microsoft.com/office/drawing/2014/main" val="1484933215"/>
+                  </a:ext>
+                </a:extLst>
+              </a:tr>
+              <a:tr h="184150">
+                <a:tc>
+                  <a:txBody>
+                    <a:bodyPr/>
+                    <a:lstStyle/>
+                    <a:p>
+                      <a:pPr algn="l" fontAlgn="b"/>
+                      <a:r>
+                        <a:rPr lang="en-US" sz="1100" b="1" i="0" u="none" strike="noStrike">
+                          <a:solidFill>
+                            <a:srgbClr val="000000"/>
+                          </a:solidFill>
+                          <a:effectLst/>
+                          <a:latin typeface="Calibri" panose="020F0502020204030204" pitchFamily="34" charset="0"/>
+                        </a:rPr>
+                        <a:t>3</a:t>
+                      </a:r>
+                    </a:p>
+                  </a:txBody>
+                  <a:tcPr marL="6350" marR="6350" marT="6350" marB="0" anchor="b">
+                    <a:lnL>
+                      <a:noFill/>
+                    </a:lnL>
+                    <a:lnR>
+                      <a:noFill/>
+                    </a:lnR>
+                    <a:lnT>
+                      <a:noFill/>
+                    </a:lnT>
+                    <a:lnB w="6350" cap="flat" cmpd="sng" algn="ctr">
+                      <a:solidFill>
+                        <a:srgbClr val="8EA9DB"/>
+                      </a:solidFill>
+                      <a:prstDash val="solid"/>
+                      <a:round/>
+                      <a:headEnd type="none" w="med" len="med"/>
+                      <a:tailEnd type="none" w="med" len="med"/>
+                    </a:lnB>
+                  </a:tcPr>
+                </a:tc>
+                <a:tc>
+                  <a:txBody>
+                    <a:bodyPr/>
+                    <a:lstStyle/>
+                    <a:p>
+                      <a:pPr algn="r" fontAlgn="b"/>
+                      <a:r>
+                        <a:rPr lang="en-US" sz="1100" b="1" i="0" u="none" strike="noStrike">
+                          <a:solidFill>
+                            <a:srgbClr val="000000"/>
+                          </a:solidFill>
+                          <a:effectLst/>
+                          <a:latin typeface="Calibri" panose="020F0502020204030204" pitchFamily="34" charset="0"/>
+                        </a:rPr>
+                        <a:t>4095</a:t>
+                      </a:r>
+                    </a:p>
+                  </a:txBody>
+                  <a:tcPr marL="6350" marR="6350" marT="6350" marB="0" anchor="b">
+                    <a:lnL>
+                      <a:noFill/>
+                    </a:lnL>
+                    <a:lnR>
+                      <a:noFill/>
+                    </a:lnR>
+                    <a:lnT>
+                      <a:noFill/>
+                    </a:lnT>
+                    <a:lnB w="6350" cap="flat" cmpd="sng" algn="ctr">
+                      <a:solidFill>
+                        <a:srgbClr val="8EA9DB"/>
+                      </a:solidFill>
+                      <a:prstDash val="solid"/>
+                      <a:round/>
+                      <a:headEnd type="none" w="med" len="med"/>
+                      <a:tailEnd type="none" w="med" len="med"/>
+                    </a:lnB>
+                  </a:tcPr>
+                </a:tc>
+                <a:tc>
+                  <a:txBody>
+                    <a:bodyPr/>
+                    <a:lstStyle/>
+                    <a:p>
+                      <a:pPr algn="l" fontAlgn="b"/>
+                      <a:endParaRPr lang="en-US" sz="1100" b="0" i="0" u="none" strike="noStrike" dirty="0">
+                        <a:solidFill>
+                          <a:srgbClr val="000000"/>
+                        </a:solidFill>
+                        <a:effectLst/>
+                        <a:latin typeface="Calibri" panose="020F0502020204030204" pitchFamily="34" charset="0"/>
+                      </a:endParaRPr>
+                    </a:p>
+                  </a:txBody>
+                  <a:tcPr marL="6350" marR="6350" marT="6350" marB="0" anchor="b">
+                    <a:lnL>
+                      <a:noFill/>
+                    </a:lnL>
+                    <a:lnR>
+                      <a:noFill/>
+                    </a:lnR>
+                    <a:lnT>
+                      <a:noFill/>
+                    </a:lnT>
+                    <a:lnB>
+                      <a:noFill/>
+                    </a:lnB>
+                  </a:tcPr>
+                </a:tc>
+                <a:extLst>
+                  <a:ext uri="{0D108BD9-81ED-4DB2-BD59-A6C34878D82A}">
+                    <a16:rowId xmlns:a16="http://schemas.microsoft.com/office/drawing/2014/main" val="3026843037"/>
+                  </a:ext>
+                </a:extLst>
+              </a:tr>
+            </a:tbl>
+          </a:graphicData>
+        </a:graphic>
+      </p:graphicFrame>
+      <p:sp>
+        <p:nvSpPr>
+          <p:cNvPr id="8" name="TextBox 7">
+            <a:extLst>
+              <a:ext uri="{FF2B5EF4-FFF2-40B4-BE49-F238E27FC236}">
+                <a16:creationId xmlns:a16="http://schemas.microsoft.com/office/drawing/2014/main" id="{3A3CFB87-EF60-4B18-BD40-56FA7173551F}"/>
+              </a:ext>
+            </a:extLst>
+          </p:cNvPr>
+          <p:cNvSpPr txBox="1"/>
+          <p:nvPr/>
+        </p:nvSpPr>
+        <p:spPr>
+          <a:xfrm>
+            <a:off x="7633111" y="4734710"/>
+            <a:ext cx="3461609" cy="430887"/>
+          </a:xfrm>
+          <a:prstGeom prst="rect">
+            <a:avLst/>
+          </a:prstGeom>
+          <a:noFill/>
+        </p:spPr>
+        <p:txBody>
+          <a:bodyPr wrap="square" rtlCol="0">
+            <a:spAutoFit/>
+          </a:bodyPr>
+          <a:lstStyle/>
+          <a:p>
+            <a:r>
+              <a:rPr lang="en-US" sz="1100" b="1" dirty="0"/>
+              <a:t>% of Defaulters with </a:t>
+            </a:r>
+            <a:r>
+              <a:rPr lang="en-US" sz="1100" b="1" dirty="0" err="1"/>
+              <a:t>emp_length</a:t>
+            </a:r>
+            <a:r>
+              <a:rPr lang="en-US" sz="1100" b="1" dirty="0"/>
+              <a:t>  NULL is higher than others</a:t>
+            </a:r>
+            <a:endParaRPr lang="en-IN" sz="1100" b="1" dirty="0"/>
+          </a:p>
+        </p:txBody>
+      </p:sp>
     </p:spTree>
     <p:extLst>
       <p:ext uri="{BB962C8B-B14F-4D97-AF65-F5344CB8AC3E}">

</xml_diff>

<commit_message>
pushing from Personal Laptop
</commit_message>
<xml_diff>
--- a/Lending Club Case Study_SelvakumarKaruppannan.pptx
+++ b/Lending Club Case Study_SelvakumarKaruppannan.pptx
@@ -10,8 +10,9 @@
     <p:sldId id="261" r:id="rId4"/>
     <p:sldId id="258" r:id="rId5"/>
     <p:sldId id="259" r:id="rId6"/>
-    <p:sldId id="260" r:id="rId7"/>
-    <p:sldId id="262" r:id="rId8"/>
+    <p:sldId id="263" r:id="rId7"/>
+    <p:sldId id="260" r:id="rId8"/>
+    <p:sldId id="262" r:id="rId9"/>
   </p:sldIdLst>
   <p:sldSz cx="12192000" cy="6858000"/>
   <p:notesSz cx="6858000" cy="9144000"/>
@@ -3362,7 +3363,7 @@
           <a:p>
             <a:fld id="{D83846A5-8AF3-45C1-9032-CE65CCBA5F4D}" type="datetimeFigureOut">
               <a:rPr lang="en-IN" smtClean="0"/>
-              <a:t>01-08-2022</a:t>
+              <a:t>05-08-2022</a:t>
             </a:fld>
             <a:endParaRPr lang="en-IN"/>
           </a:p>
@@ -3570,7 +3571,7 @@
           <a:p>
             <a:fld id="{D83846A5-8AF3-45C1-9032-CE65CCBA5F4D}" type="datetimeFigureOut">
               <a:rPr lang="en-IN" smtClean="0"/>
-              <a:t>01-08-2022</a:t>
+              <a:t>05-08-2022</a:t>
             </a:fld>
             <a:endParaRPr lang="en-IN"/>
           </a:p>
@@ -3826,7 +3827,7 @@
           <a:p>
             <a:fld id="{D83846A5-8AF3-45C1-9032-CE65CCBA5F4D}" type="datetimeFigureOut">
               <a:rPr lang="en-IN" smtClean="0"/>
-              <a:t>01-08-2022</a:t>
+              <a:t>05-08-2022</a:t>
             </a:fld>
             <a:endParaRPr lang="en-IN"/>
           </a:p>
@@ -4000,7 +4001,7 @@
           <a:p>
             <a:fld id="{D83846A5-8AF3-45C1-9032-CE65CCBA5F4D}" type="datetimeFigureOut">
               <a:rPr lang="en-IN" smtClean="0"/>
-              <a:t>01-08-2022</a:t>
+              <a:t>05-08-2022</a:t>
             </a:fld>
             <a:endParaRPr lang="en-IN"/>
           </a:p>
@@ -4343,7 +4344,7 @@
           <a:p>
             <a:fld id="{D83846A5-8AF3-45C1-9032-CE65CCBA5F4D}" type="datetimeFigureOut">
               <a:rPr lang="en-IN" smtClean="0"/>
-              <a:t>01-08-2022</a:t>
+              <a:t>05-08-2022</a:t>
             </a:fld>
             <a:endParaRPr lang="en-IN"/>
           </a:p>
@@ -4618,7 +4619,7 @@
           <a:p>
             <a:fld id="{D83846A5-8AF3-45C1-9032-CE65CCBA5F4D}" type="datetimeFigureOut">
               <a:rPr lang="en-IN" smtClean="0"/>
-              <a:t>01-08-2022</a:t>
+              <a:t>05-08-2022</a:t>
             </a:fld>
             <a:endParaRPr lang="en-IN"/>
           </a:p>
@@ -4997,7 +4998,7 @@
           <a:p>
             <a:fld id="{D83846A5-8AF3-45C1-9032-CE65CCBA5F4D}" type="datetimeFigureOut">
               <a:rPr lang="en-IN" smtClean="0"/>
-              <a:t>01-08-2022</a:t>
+              <a:t>05-08-2022</a:t>
             </a:fld>
             <a:endParaRPr lang="en-IN"/>
           </a:p>
@@ -5115,7 +5116,7 @@
           <a:p>
             <a:fld id="{D83846A5-8AF3-45C1-9032-CE65CCBA5F4D}" type="datetimeFigureOut">
               <a:rPr lang="en-IN" smtClean="0"/>
-              <a:t>01-08-2022</a:t>
+              <a:t>05-08-2022</a:t>
             </a:fld>
             <a:endParaRPr lang="en-IN"/>
           </a:p>
@@ -5286,7 +5287,7 @@
           <a:p>
             <a:fld id="{D83846A5-8AF3-45C1-9032-CE65CCBA5F4D}" type="datetimeFigureOut">
               <a:rPr lang="en-IN" smtClean="0"/>
-              <a:t>01-08-2022</a:t>
+              <a:t>05-08-2022</a:t>
             </a:fld>
             <a:endParaRPr lang="en-IN"/>
           </a:p>
@@ -5640,7 +5641,7 @@
           <a:p>
             <a:fld id="{D83846A5-8AF3-45C1-9032-CE65CCBA5F4D}" type="datetimeFigureOut">
               <a:rPr lang="en-IN" smtClean="0"/>
-              <a:t>01-08-2022</a:t>
+              <a:t>05-08-2022</a:t>
             </a:fld>
             <a:endParaRPr lang="en-IN"/>
           </a:p>
@@ -6022,7 +6023,7 @@
           <a:p>
             <a:fld id="{D83846A5-8AF3-45C1-9032-CE65CCBA5F4D}" type="datetimeFigureOut">
               <a:rPr lang="en-IN" smtClean="0"/>
-              <a:t>01-08-2022</a:t>
+              <a:t>05-08-2022</a:t>
             </a:fld>
             <a:endParaRPr lang="en-IN"/>
           </a:p>
@@ -6309,7 +6310,7 @@
           <a:p>
             <a:fld id="{D83846A5-8AF3-45C1-9032-CE65CCBA5F4D}" type="datetimeFigureOut">
               <a:rPr lang="en-IN" smtClean="0"/>
-              <a:t>01-08-2022</a:t>
+              <a:t>05-08-2022</a:t>
             </a:fld>
             <a:endParaRPr lang="en-IN"/>
           </a:p>
@@ -8121,6 +8122,154 @@
             </a:br>
             <a:r>
               <a:rPr lang="en-US" sz="2800" dirty="0"/>
+              <a:t>Univariate and segmented univariate analysis</a:t>
+            </a:r>
+            <a:endParaRPr lang="en-IN" dirty="0"/>
+          </a:p>
+        </p:txBody>
+      </p:sp>
+      <p:sp>
+        <p:nvSpPr>
+          <p:cNvPr id="7" name="TextBox 6">
+            <a:extLst>
+              <a:ext uri="{FF2B5EF4-FFF2-40B4-BE49-F238E27FC236}">
+                <a16:creationId xmlns:a16="http://schemas.microsoft.com/office/drawing/2014/main" id="{1FF2DF1D-57C0-A25D-1B8C-8BBA0F3FE197}"/>
+              </a:ext>
+            </a:extLst>
+          </p:cNvPr>
+          <p:cNvSpPr txBox="1"/>
+          <p:nvPr/>
+        </p:nvSpPr>
+        <p:spPr>
+          <a:xfrm>
+            <a:off x="894782" y="4737786"/>
+            <a:ext cx="3497463" cy="430887"/>
+          </a:xfrm>
+          <a:prstGeom prst="rect">
+            <a:avLst/>
+          </a:prstGeom>
+          <a:noFill/>
+        </p:spPr>
+        <p:txBody>
+          <a:bodyPr wrap="square" rtlCol="0">
+            <a:spAutoFit/>
+          </a:bodyPr>
+          <a:lstStyle/>
+          <a:p>
+            <a:r>
+              <a:rPr lang="en-US" sz="1100" b="1" dirty="0"/>
+              <a:t>Customers who got loan for </a:t>
+            </a:r>
+            <a:r>
+              <a:rPr lang="en-US" sz="1100" b="1" dirty="0" err="1"/>
+              <a:t>debt_consolidation</a:t>
+            </a:r>
+            <a:r>
+              <a:rPr lang="en-US" sz="1100" b="1" dirty="0"/>
+              <a:t> has relatively defaulted more than other customers</a:t>
+            </a:r>
+            <a:endParaRPr lang="en-IN" sz="1100" b="1" dirty="0"/>
+          </a:p>
+        </p:txBody>
+      </p:sp>
+      <p:pic>
+        <p:nvPicPr>
+          <p:cNvPr id="5" name="Picture 4">
+            <a:extLst>
+              <a:ext uri="{FF2B5EF4-FFF2-40B4-BE49-F238E27FC236}">
+                <a16:creationId xmlns:a16="http://schemas.microsoft.com/office/drawing/2014/main" id="{3BF3F436-D3D8-286B-EC72-9C9E39ED510B}"/>
+              </a:ext>
+            </a:extLst>
+          </p:cNvPr>
+          <p:cNvPicPr>
+            <a:picLocks noChangeAspect="1"/>
+          </p:cNvPicPr>
+          <p:nvPr/>
+        </p:nvPicPr>
+        <p:blipFill>
+          <a:blip r:embed="rId2">
+            <a:extLst>
+              <a:ext uri="{28A0092B-C50C-407E-A947-70E740481C1C}">
+                <a14:useLocalDpi xmlns:a14="http://schemas.microsoft.com/office/drawing/2010/main" val="0"/>
+              </a:ext>
+            </a:extLst>
+          </a:blip>
+          <a:stretch>
+            <a:fillRect/>
+          </a:stretch>
+        </p:blipFill>
+        <p:spPr>
+          <a:xfrm>
+            <a:off x="663404" y="1905295"/>
+            <a:ext cx="3728841" cy="2880000"/>
+          </a:xfrm>
+          <a:prstGeom prst="rect">
+            <a:avLst/>
+          </a:prstGeom>
+        </p:spPr>
+      </p:pic>
+    </p:spTree>
+    <p:extLst>
+      <p:ext uri="{BB962C8B-B14F-4D97-AF65-F5344CB8AC3E}">
+        <p14:creationId xmlns:p14="http://schemas.microsoft.com/office/powerpoint/2010/main" val="1772162652"/>
+      </p:ext>
+    </p:extLst>
+  </p:cSld>
+  <p:clrMapOvr>
+    <a:masterClrMapping/>
+  </p:clrMapOvr>
+</p:sld>
+</file>
+
+<file path=ppt/slides/slide7.xml><?xml version="1.0" encoding="utf-8"?>
+<p:sld xmlns:a="http://schemas.openxmlformats.org/drawingml/2006/main" xmlns:r="http://schemas.openxmlformats.org/officeDocument/2006/relationships" xmlns:p="http://schemas.openxmlformats.org/presentationml/2006/main">
+  <p:cSld>
+    <p:spTree>
+      <p:nvGrpSpPr>
+        <p:cNvPr id="1" name=""/>
+        <p:cNvGrpSpPr/>
+        <p:nvPr/>
+      </p:nvGrpSpPr>
+      <p:grpSpPr>
+        <a:xfrm>
+          <a:off x="0" y="0"/>
+          <a:ext cx="0" cy="0"/>
+          <a:chOff x="0" y="0"/>
+          <a:chExt cx="0" cy="0"/>
+        </a:xfrm>
+      </p:grpSpPr>
+      <p:sp>
+        <p:nvSpPr>
+          <p:cNvPr id="2" name="Title 1">
+            <a:extLst>
+              <a:ext uri="{FF2B5EF4-FFF2-40B4-BE49-F238E27FC236}">
+                <a16:creationId xmlns:a16="http://schemas.microsoft.com/office/drawing/2014/main" id="{8B611A6A-764B-DB42-9E7B-DF15BE16BC79}"/>
+              </a:ext>
+            </a:extLst>
+          </p:cNvPr>
+          <p:cNvSpPr>
+            <a:spLocks noGrp="1"/>
+          </p:cNvSpPr>
+          <p:nvPr>
+            <p:ph type="title"/>
+          </p:nvPr>
+        </p:nvSpPr>
+        <p:spPr/>
+        <p:txBody>
+          <a:bodyPr>
+            <a:normAutofit/>
+          </a:bodyPr>
+          <a:lstStyle/>
+          <a:p>
+            <a:r>
+              <a:rPr lang="en-US" dirty="0"/>
+              <a:t>Lending Club Case Study</a:t>
+            </a:r>
+            <a:br>
+              <a:rPr lang="en-US" dirty="0"/>
+            </a:br>
+            <a:r>
+              <a:rPr lang="en-US" sz="2800" dirty="0"/>
               <a:t>Bivariate analysis</a:t>
             </a:r>
             <a:endParaRPr lang="en-IN" dirty="0"/>
@@ -8171,7 +8320,7 @@
 </p:sld>
 </file>
 
-<file path=ppt/slides/slide7.xml><?xml version="1.0" encoding="utf-8"?>
+<file path=ppt/slides/slide8.xml><?xml version="1.0" encoding="utf-8"?>
 <p:sld xmlns:a="http://schemas.openxmlformats.org/drawingml/2006/main" xmlns:r="http://schemas.openxmlformats.org/officeDocument/2006/relationships" xmlns:p="http://schemas.openxmlformats.org/presentationml/2006/main">
   <p:cSld>
     <p:spTree>

</xml_diff>